<commit_message>
Changed presentations to fit new approach.
</commit_message>
<xml_diff>
--- a/Presentations/1 - Introduction - ReSharper Course.pptx
+++ b/Presentations/1 - Introduction - ReSharper Course.pptx
@@ -129,7 +129,7 @@
   </p:defaultTextStyle>
   <p:extLst>
     <p:ext uri="{521415D9-36F7-43E2-AB2F-B90AF26B5E84}">
-      <p14:sectionLst xmlns:p14="http://schemas.microsoft.com/office/powerpoint/2010/main">
+      <p14:sectionLst xmlns:p14="http://schemas.microsoft.com/office/powerpoint/2010/main" xmlns="">
         <p14:section name="Introduction" id="{39D98063-5C61-484A-A1C2-F0AEF4936815}">
           <p14:sldIdLst>
             <p14:sldId id="256"/>
@@ -179,24 +179,12 @@
 
 <file path=ppt/charts/chart1.xml><?xml version="1.0" encoding="utf-8"?>
 <c:chartSpace xmlns:c="http://schemas.openxmlformats.org/drawingml/2006/chart" xmlns:a="http://schemas.openxmlformats.org/drawingml/2006/main" xmlns:r="http://schemas.openxmlformats.org/officeDocument/2006/relationships">
-  <c:date1904 val="0"/>
   <c:lang val="da-DK"/>
-  <c:roundedCorners val="0"/>
-  <mc:AlternateContent xmlns:mc="http://schemas.openxmlformats.org/markup-compatibility/2006">
-    <mc:Choice xmlns:c14="http://schemas.microsoft.com/office/drawing/2007/8/2/chart" Requires="c14">
-      <c14:style val="102"/>
-    </mc:Choice>
-    <mc:Fallback>
-      <c:style val="2"/>
-    </mc:Fallback>
-  </mc:AlternateContent>
   <c:chart>
-    <c:autoTitleDeleted val="0"/>
     <c:plotArea>
       <c:layout/>
       <c:lineChart>
         <c:grouping val="standard"/>
-        <c:varyColors val="0"/>
         <c:ser>
           <c:idx val="0"/>
           <c:order val="0"/>
@@ -252,7 +240,6 @@
               </c:numCache>
             </c:numRef>
           </c:val>
-          <c:smooth val="0"/>
         </c:ser>
         <c:ser>
           <c:idx val="1"/>
@@ -309,52 +296,36 @@
               </c:numCache>
             </c:numRef>
           </c:val>
-          <c:smooth val="0"/>
         </c:ser>
-        <c:dLbls>
-          <c:showLegendKey val="0"/>
-          <c:showVal val="0"/>
-          <c:showCatName val="0"/>
-          <c:showSerName val="0"/>
-          <c:showPercent val="0"/>
-          <c:showBubbleSize val="0"/>
-        </c:dLbls>
+        <c:dLbls/>
         <c:marker val="1"/>
-        <c:smooth val="0"/>
-        <c:axId val="5185536"/>
-        <c:axId val="5187072"/>
+        <c:axId val="115460736"/>
+        <c:axId val="115474816"/>
       </c:lineChart>
       <c:catAx>
-        <c:axId val="5185536"/>
+        <c:axId val="115460736"/>
         <c:scaling>
           <c:orientation val="minMax"/>
         </c:scaling>
-        <c:delete val="0"/>
         <c:axPos val="b"/>
         <c:numFmt formatCode="General" sourceLinked="1"/>
-        <c:majorTickMark val="out"/>
-        <c:minorTickMark val="none"/>
         <c:tickLblPos val="nextTo"/>
-        <c:crossAx val="5187072"/>
+        <c:crossAx val="115474816"/>
         <c:crosses val="autoZero"/>
         <c:auto val="1"/>
         <c:lblAlgn val="ctr"/>
         <c:lblOffset val="100"/>
-        <c:noMultiLvlLbl val="0"/>
       </c:catAx>
       <c:valAx>
-        <c:axId val="5187072"/>
+        <c:axId val="115474816"/>
         <c:scaling>
           <c:orientation val="minMax"/>
         </c:scaling>
-        <c:delete val="0"/>
         <c:axPos val="l"/>
         <c:majorGridlines/>
         <c:numFmt formatCode="General" sourceLinked="1"/>
-        <c:majorTickMark val="out"/>
-        <c:minorTickMark val="none"/>
         <c:tickLblPos val="none"/>
-        <c:crossAx val="5185536"/>
+        <c:crossAx val="115460736"/>
         <c:crosses val="autoZero"/>
         <c:crossBetween val="between"/>
       </c:valAx>
@@ -365,17 +336,16 @@
         <c:manualLayout>
           <c:xMode val="edge"/>
           <c:yMode val="edge"/>
-          <c:x val="5.3899562554680647E-2"/>
+          <c:x val="5.3899562554680661E-2"/>
           <c:y val="9.198891998979869E-2"/>
           <c:w val="0.30225817227392032"/>
-          <c:h val="0.25004681847201532"/>
+          <c:h val="0.25004681847201526"/>
         </c:manualLayout>
       </c:layout>
       <c:overlay val="1"/>
     </c:legend>
     <c:plotVisOnly val="1"/>
     <c:dispBlanksAs val="zero"/>
-    <c:showDLblsOverMax val="0"/>
   </c:chart>
   <c:txPr>
     <a:bodyPr/>
@@ -387,25 +357,13 @@
       <a:endParaRPr lang="da-DK"/>
     </a:p>
   </c:txPr>
-  <c:externalData r:id="rId1">
-    <c:autoUpdate val="0"/>
-  </c:externalData>
+  <c:externalData r:id="rId1"/>
 </c:chartSpace>
 </file>
 
 <file path=ppt/charts/chart2.xml><?xml version="1.0" encoding="utf-8"?>
 <c:chartSpace xmlns:c="http://schemas.openxmlformats.org/drawingml/2006/chart" xmlns:a="http://schemas.openxmlformats.org/drawingml/2006/main" xmlns:r="http://schemas.openxmlformats.org/officeDocument/2006/relationships">
-  <c:date1904 val="0"/>
   <c:lang val="da-DK"/>
-  <c:roundedCorners val="0"/>
-  <mc:AlternateContent xmlns:mc="http://schemas.openxmlformats.org/markup-compatibility/2006">
-    <mc:Choice xmlns:c14="http://schemas.microsoft.com/office/drawing/2007/8/2/chart" Requires="c14">
-      <c14:style val="102"/>
-    </mc:Choice>
-    <mc:Fallback>
-      <c:style val="2"/>
-    </mc:Fallback>
-  </mc:AlternateContent>
   <c:chart>
     <c:autoTitleDeleted val="1"/>
     <c:plotArea>
@@ -460,15 +418,7 @@
             </c:numRef>
           </c:val>
         </c:ser>
-        <c:dLbls>
-          <c:showLegendKey val="0"/>
-          <c:showVal val="0"/>
-          <c:showCatName val="0"/>
-          <c:showSerName val="0"/>
-          <c:showPercent val="0"/>
-          <c:showBubbleSize val="0"/>
-          <c:showLeaderLines val="1"/>
-        </c:dLbls>
+        <c:dLbls/>
         <c:firstSliceAng val="338"/>
       </c:pieChart>
     </c:plotArea>
@@ -478,8 +428,7 @@
       <c:overlay val="1"/>
     </c:legend>
     <c:plotVisOnly val="1"/>
-    <c:dispBlanksAs val="gap"/>
-    <c:showDLblsOverMax val="0"/>
+    <c:dispBlanksAs val="zero"/>
   </c:chart>
   <c:txPr>
     <a:bodyPr/>
@@ -491,25 +440,13 @@
       <a:endParaRPr lang="da-DK"/>
     </a:p>
   </c:txPr>
-  <c:externalData r:id="rId1">
-    <c:autoUpdate val="0"/>
-  </c:externalData>
+  <c:externalData r:id="rId1"/>
 </c:chartSpace>
 </file>
 
 <file path=ppt/charts/chart3.xml><?xml version="1.0" encoding="utf-8"?>
 <c:chartSpace xmlns:c="http://schemas.openxmlformats.org/drawingml/2006/chart" xmlns:a="http://schemas.openxmlformats.org/drawingml/2006/main" xmlns:r="http://schemas.openxmlformats.org/officeDocument/2006/relationships">
-  <c:date1904 val="0"/>
   <c:lang val="da-DK"/>
-  <c:roundedCorners val="0"/>
-  <mc:AlternateContent xmlns:mc="http://schemas.openxmlformats.org/markup-compatibility/2006">
-    <mc:Choice xmlns:c14="http://schemas.microsoft.com/office/drawing/2007/8/2/chart" Requires="c14">
-      <c14:style val="102"/>
-    </mc:Choice>
-    <mc:Fallback>
-      <c:style val="2"/>
-    </mc:Fallback>
-  </mc:AlternateContent>
   <c:chart>
     <c:autoTitleDeleted val="1"/>
     <c:plotArea>
@@ -570,15 +507,7 @@
             </c:numRef>
           </c:val>
         </c:ser>
-        <c:dLbls>
-          <c:showLegendKey val="0"/>
-          <c:showVal val="0"/>
-          <c:showCatName val="0"/>
-          <c:showSerName val="0"/>
-          <c:showPercent val="0"/>
-          <c:showBubbleSize val="0"/>
-          <c:showLeaderLines val="1"/>
-        </c:dLbls>
+        <c:dLbls/>
         <c:firstSliceAng val="338"/>
       </c:pieChart>
     </c:plotArea>
@@ -588,8 +517,7 @@
       <c:overlay val="1"/>
     </c:legend>
     <c:plotVisOnly val="1"/>
-    <c:dispBlanksAs val="gap"/>
-    <c:showDLblsOverMax val="0"/>
+    <c:dispBlanksAs val="zero"/>
   </c:chart>
   <c:txPr>
     <a:bodyPr/>
@@ -601,25 +529,13 @@
       <a:endParaRPr lang="da-DK"/>
     </a:p>
   </c:txPr>
-  <c:externalData r:id="rId1">
-    <c:autoUpdate val="0"/>
-  </c:externalData>
+  <c:externalData r:id="rId1"/>
 </c:chartSpace>
 </file>
 
 <file path=ppt/charts/chart4.xml><?xml version="1.0" encoding="utf-8"?>
 <c:chartSpace xmlns:c="http://schemas.openxmlformats.org/drawingml/2006/chart" xmlns:a="http://schemas.openxmlformats.org/drawingml/2006/main" xmlns:r="http://schemas.openxmlformats.org/officeDocument/2006/relationships">
-  <c:date1904 val="0"/>
   <c:lang val="da-DK"/>
-  <c:roundedCorners val="0"/>
-  <mc:AlternateContent xmlns:mc="http://schemas.openxmlformats.org/markup-compatibility/2006">
-    <mc:Choice xmlns:c14="http://schemas.microsoft.com/office/drawing/2007/8/2/chart" Requires="c14">
-      <c14:style val="102"/>
-    </mc:Choice>
-    <mc:Fallback>
-      <c:style val="2"/>
-    </mc:Fallback>
-  </mc:AlternateContent>
   <c:chart>
     <c:autoTitleDeleted val="1"/>
     <c:plotArea>
@@ -686,15 +602,7 @@
             </c:numRef>
           </c:val>
         </c:ser>
-        <c:dLbls>
-          <c:showLegendKey val="0"/>
-          <c:showVal val="0"/>
-          <c:showCatName val="0"/>
-          <c:showSerName val="0"/>
-          <c:showPercent val="0"/>
-          <c:showBubbleSize val="0"/>
-          <c:showLeaderLines val="1"/>
-        </c:dLbls>
+        <c:dLbls/>
         <c:firstSliceAng val="338"/>
       </c:pieChart>
     </c:plotArea>
@@ -704,8 +612,7 @@
       <c:overlay val="1"/>
     </c:legend>
     <c:plotVisOnly val="1"/>
-    <c:dispBlanksAs val="gap"/>
-    <c:showDLblsOverMax val="0"/>
+    <c:dispBlanksAs val="zero"/>
   </c:chart>
   <c:txPr>
     <a:bodyPr/>
@@ -717,25 +624,13 @@
       <a:endParaRPr lang="da-DK"/>
     </a:p>
   </c:txPr>
-  <c:externalData r:id="rId1">
-    <c:autoUpdate val="0"/>
-  </c:externalData>
+  <c:externalData r:id="rId1"/>
 </c:chartSpace>
 </file>
 
 <file path=ppt/charts/chart5.xml><?xml version="1.0" encoding="utf-8"?>
 <c:chartSpace xmlns:c="http://schemas.openxmlformats.org/drawingml/2006/chart" xmlns:a="http://schemas.openxmlformats.org/drawingml/2006/main" xmlns:r="http://schemas.openxmlformats.org/officeDocument/2006/relationships">
-  <c:date1904 val="0"/>
   <c:lang val="da-DK"/>
-  <c:roundedCorners val="0"/>
-  <mc:AlternateContent xmlns:mc="http://schemas.openxmlformats.org/markup-compatibility/2006">
-    <mc:Choice xmlns:c14="http://schemas.microsoft.com/office/drawing/2007/8/2/chart" Requires="c14">
-      <c14:style val="102"/>
-    </mc:Choice>
-    <mc:Fallback>
-      <c:style val="2"/>
-    </mc:Fallback>
-  </mc:AlternateContent>
   <c:chart>
     <c:autoTitleDeleted val="1"/>
     <c:plotArea>
@@ -808,15 +703,7 @@
             </c:numRef>
           </c:val>
         </c:ser>
-        <c:dLbls>
-          <c:showLegendKey val="0"/>
-          <c:showVal val="0"/>
-          <c:showCatName val="0"/>
-          <c:showSerName val="0"/>
-          <c:showPercent val="0"/>
-          <c:showBubbleSize val="0"/>
-          <c:showLeaderLines val="1"/>
-        </c:dLbls>
+        <c:dLbls/>
         <c:firstSliceAng val="338"/>
       </c:pieChart>
     </c:plotArea>
@@ -826,8 +713,7 @@
       <c:overlay val="1"/>
     </c:legend>
     <c:plotVisOnly val="1"/>
-    <c:dispBlanksAs val="gap"/>
-    <c:showDLblsOverMax val="0"/>
+    <c:dispBlanksAs val="zero"/>
   </c:chart>
   <c:txPr>
     <a:bodyPr/>
@@ -839,25 +725,13 @@
       <a:endParaRPr lang="da-DK"/>
     </a:p>
   </c:txPr>
-  <c:externalData r:id="rId1">
-    <c:autoUpdate val="0"/>
-  </c:externalData>
+  <c:externalData r:id="rId1"/>
 </c:chartSpace>
 </file>
 
 <file path=ppt/charts/chart6.xml><?xml version="1.0" encoding="utf-8"?>
 <c:chartSpace xmlns:c="http://schemas.openxmlformats.org/drawingml/2006/chart" xmlns:a="http://schemas.openxmlformats.org/drawingml/2006/main" xmlns:r="http://schemas.openxmlformats.org/officeDocument/2006/relationships">
-  <c:date1904 val="0"/>
   <c:lang val="da-DK"/>
-  <c:roundedCorners val="0"/>
-  <mc:AlternateContent xmlns:mc="http://schemas.openxmlformats.org/markup-compatibility/2006">
-    <mc:Choice xmlns:c14="http://schemas.microsoft.com/office/drawing/2007/8/2/chart" Requires="c14">
-      <c14:style val="102"/>
-    </mc:Choice>
-    <mc:Fallback>
-      <c:style val="2"/>
-    </mc:Fallback>
-  </mc:AlternateContent>
   <c:chart>
     <c:autoTitleDeleted val="1"/>
     <c:plotArea>
@@ -930,15 +804,7 @@
             </c:numRef>
           </c:val>
         </c:ser>
-        <c:dLbls>
-          <c:showLegendKey val="0"/>
-          <c:showVal val="0"/>
-          <c:showCatName val="0"/>
-          <c:showSerName val="0"/>
-          <c:showPercent val="0"/>
-          <c:showBubbleSize val="0"/>
-          <c:showLeaderLines val="1"/>
-        </c:dLbls>
+        <c:dLbls/>
         <c:firstSliceAng val="338"/>
       </c:pieChart>
     </c:plotArea>
@@ -948,8 +814,7 @@
       <c:overlay val="1"/>
     </c:legend>
     <c:plotVisOnly val="1"/>
-    <c:dispBlanksAs val="gap"/>
-    <c:showDLblsOverMax val="0"/>
+    <c:dispBlanksAs val="zero"/>
   </c:chart>
   <c:txPr>
     <a:bodyPr/>
@@ -961,25 +826,13 @@
       <a:endParaRPr lang="da-DK"/>
     </a:p>
   </c:txPr>
-  <c:externalData r:id="rId1">
-    <c:autoUpdate val="0"/>
-  </c:externalData>
+  <c:externalData r:id="rId1"/>
 </c:chartSpace>
 </file>
 
 <file path=ppt/charts/chart7.xml><?xml version="1.0" encoding="utf-8"?>
 <c:chartSpace xmlns:c="http://schemas.openxmlformats.org/drawingml/2006/chart" xmlns:a="http://schemas.openxmlformats.org/drawingml/2006/main" xmlns:r="http://schemas.openxmlformats.org/officeDocument/2006/relationships">
-  <c:date1904 val="0"/>
   <c:lang val="da-DK"/>
-  <c:roundedCorners val="0"/>
-  <mc:AlternateContent xmlns:mc="http://schemas.openxmlformats.org/markup-compatibility/2006">
-    <mc:Choice xmlns:c14="http://schemas.microsoft.com/office/drawing/2007/8/2/chart" Requires="c14">
-      <c14:style val="102"/>
-    </mc:Choice>
-    <mc:Fallback>
-      <c:style val="2"/>
-    </mc:Fallback>
-  </mc:AlternateContent>
   <c:chart>
     <c:autoTitleDeleted val="1"/>
     <c:plotArea>
@@ -1012,7 +865,6 @@
           </c:spPr>
           <c:dPt>
             <c:idx val="2"/>
-            <c:bubble3D val="0"/>
             <c:spPr>
               <a:noFill/>
               <a:effectLst/>
@@ -1027,7 +879,6 @@
           </c:dPt>
           <c:dPt>
             <c:idx val="3"/>
-            <c:bubble3D val="0"/>
             <c:spPr>
               <a:noFill/>
               <a:effectLst/>
@@ -1082,15 +933,7 @@
             </c:numRef>
           </c:val>
         </c:ser>
-        <c:dLbls>
-          <c:showLegendKey val="0"/>
-          <c:showVal val="0"/>
-          <c:showCatName val="0"/>
-          <c:showSerName val="0"/>
-          <c:showPercent val="0"/>
-          <c:showBubbleSize val="0"/>
-          <c:showLeaderLines val="1"/>
-        </c:dLbls>
+        <c:dLbls/>
         <c:firstSliceAng val="338"/>
       </c:pieChart>
     </c:plotArea>
@@ -1100,8 +943,7 @@
       <c:overlay val="1"/>
     </c:legend>
     <c:plotVisOnly val="1"/>
-    <c:dispBlanksAs val="gap"/>
-    <c:showDLblsOverMax val="0"/>
+    <c:dispBlanksAs val="zero"/>
   </c:chart>
   <c:txPr>
     <a:bodyPr/>
@@ -1113,9 +955,7 @@
       <a:endParaRPr lang="da-DK"/>
     </a:p>
   </c:txPr>
-  <c:externalData r:id="rId1">
-    <c:autoUpdate val="0"/>
-  </c:externalData>
+  <c:externalData r:id="rId1"/>
 </c:chartSpace>
 </file>
 
@@ -1202,7 +1042,7 @@
             <a:fld id="{25D31F56-D80D-4507-AC0F-AB5E545C4181}" type="datetimeFigureOut">
               <a:rPr lang="da-DK" smtClean="0"/>
               <a:pPr/>
-              <a:t>21-05-2012</a:t>
+              <a:t>22-05-2012</a:t>
             </a:fld>
             <a:endParaRPr lang="da-DK"/>
           </a:p>
@@ -1371,7 +1211,7 @@
     </p:spTree>
     <p:extLst>
       <p:ext uri="{BB962C8B-B14F-4D97-AF65-F5344CB8AC3E}">
-        <p14:creationId xmlns:p14="http://schemas.microsoft.com/office/powerpoint/2010/main" val="1746408167"/>
+        <p14:creationId xmlns:p14="http://schemas.microsoft.com/office/powerpoint/2010/main" xmlns="" val="1746408167"/>
       </p:ext>
     </p:extLst>
   </p:cSld>
@@ -1573,7 +1413,7 @@
     </p:spTree>
     <p:extLst>
       <p:ext uri="{BB962C8B-B14F-4D97-AF65-F5344CB8AC3E}">
-        <p14:creationId xmlns:p14="http://schemas.microsoft.com/office/powerpoint/2010/main" val="1950793053"/>
+        <p14:creationId xmlns:p14="http://schemas.microsoft.com/office/powerpoint/2010/main" xmlns="" val="1950793053"/>
       </p:ext>
     </p:extLst>
   </p:cSld>
@@ -1765,7 +1605,7 @@
             <a:fld id="{1D8BD707-D9CF-40AE-B4C6-C98DA3205C09}" type="datetimeFigureOut">
               <a:rPr lang="en-US" smtClean="0"/>
               <a:pPr/>
-              <a:t>5/21/2012</a:t>
+              <a:t>5/22/2012</a:t>
             </a:fld>
             <a:endParaRPr lang="en-US"/>
           </a:p>
@@ -1932,7 +1772,7 @@
             <a:fld id="{1D8BD707-D9CF-40AE-B4C6-C98DA3205C09}" type="datetimeFigureOut">
               <a:rPr lang="en-US" smtClean="0"/>
               <a:pPr/>
-              <a:t>5/21/2012</a:t>
+              <a:t>5/22/2012</a:t>
             </a:fld>
             <a:endParaRPr lang="en-US"/>
           </a:p>
@@ -2109,7 +1949,7 @@
             <a:fld id="{1D8BD707-D9CF-40AE-B4C6-C98DA3205C09}" type="datetimeFigureOut">
               <a:rPr lang="en-US" smtClean="0"/>
               <a:pPr/>
-              <a:t>5/21/2012</a:t>
+              <a:t>5/22/2012</a:t>
             </a:fld>
             <a:endParaRPr lang="en-US"/>
           </a:p>
@@ -2276,7 +2116,7 @@
             <a:fld id="{1D8BD707-D9CF-40AE-B4C6-C98DA3205C09}" type="datetimeFigureOut">
               <a:rPr lang="en-US" smtClean="0"/>
               <a:pPr/>
-              <a:t>5/21/2012</a:t>
+              <a:t>5/22/2012</a:t>
             </a:fld>
             <a:endParaRPr lang="en-US"/>
           </a:p>
@@ -2519,7 +2359,7 @@
             <a:fld id="{1D8BD707-D9CF-40AE-B4C6-C98DA3205C09}" type="datetimeFigureOut">
               <a:rPr lang="en-US" smtClean="0"/>
               <a:pPr/>
-              <a:t>5/21/2012</a:t>
+              <a:t>5/22/2012</a:t>
             </a:fld>
             <a:endParaRPr lang="en-US"/>
           </a:p>
@@ -2804,7 +2644,7 @@
             <a:fld id="{1D8BD707-D9CF-40AE-B4C6-C98DA3205C09}" type="datetimeFigureOut">
               <a:rPr lang="en-US" smtClean="0"/>
               <a:pPr/>
-              <a:t>5/21/2012</a:t>
+              <a:t>5/22/2012</a:t>
             </a:fld>
             <a:endParaRPr lang="en-US"/>
           </a:p>
@@ -3223,7 +3063,7 @@
             <a:fld id="{1D8BD707-D9CF-40AE-B4C6-C98DA3205C09}" type="datetimeFigureOut">
               <a:rPr lang="en-US" smtClean="0"/>
               <a:pPr/>
-              <a:t>5/21/2012</a:t>
+              <a:t>5/22/2012</a:t>
             </a:fld>
             <a:endParaRPr lang="en-US"/>
           </a:p>
@@ -3338,7 +3178,7 @@
             <a:fld id="{1D8BD707-D9CF-40AE-B4C6-C98DA3205C09}" type="datetimeFigureOut">
               <a:rPr lang="en-US" smtClean="0"/>
               <a:pPr/>
-              <a:t>5/21/2012</a:t>
+              <a:t>5/22/2012</a:t>
             </a:fld>
             <a:endParaRPr lang="en-US"/>
           </a:p>
@@ -3430,7 +3270,7 @@
             <a:fld id="{1D8BD707-D9CF-40AE-B4C6-C98DA3205C09}" type="datetimeFigureOut">
               <a:rPr lang="en-US" smtClean="0"/>
               <a:pPr/>
-              <a:t>5/21/2012</a:t>
+              <a:t>5/22/2012</a:t>
             </a:fld>
             <a:endParaRPr lang="en-US"/>
           </a:p>
@@ -3704,7 +3544,7 @@
             <a:fld id="{1D8BD707-D9CF-40AE-B4C6-C98DA3205C09}" type="datetimeFigureOut">
               <a:rPr lang="en-US" smtClean="0"/>
               <a:pPr/>
-              <a:t>5/21/2012</a:t>
+              <a:t>5/22/2012</a:t>
             </a:fld>
             <a:endParaRPr lang="en-US"/>
           </a:p>
@@ -3954,7 +3794,7 @@
             <a:fld id="{1D8BD707-D9CF-40AE-B4C6-C98DA3205C09}" type="datetimeFigureOut">
               <a:rPr lang="en-US" smtClean="0"/>
               <a:pPr/>
-              <a:t>5/21/2012</a:t>
+              <a:t>5/22/2012</a:t>
             </a:fld>
             <a:endParaRPr lang="en-US"/>
           </a:p>
@@ -4164,7 +4004,7 @@
             <a:fld id="{1D8BD707-D9CF-40AE-B4C6-C98DA3205C09}" type="datetimeFigureOut">
               <a:rPr lang="en-US" smtClean="0"/>
               <a:pPr/>
-              <a:t>5/21/2012</a:t>
+              <a:t>5/22/2012</a:t>
             </a:fld>
             <a:endParaRPr lang="en-US"/>
           </a:p>
@@ -4610,7 +4450,7 @@
     </p:spTree>
     <p:extLst>
       <p:ext uri="{BB962C8B-B14F-4D97-AF65-F5344CB8AC3E}">
-        <p14:creationId xmlns:p14="http://schemas.microsoft.com/office/powerpoint/2010/main" val="3481993744"/>
+        <p14:creationId xmlns:p14="http://schemas.microsoft.com/office/powerpoint/2010/main" xmlns="" val="3481993744"/>
       </p:ext>
     </p:extLst>
   </p:cSld>
@@ -4752,7 +4592,7 @@
     </p:spTree>
     <p:extLst>
       <p:ext uri="{BB962C8B-B14F-4D97-AF65-F5344CB8AC3E}">
-        <p14:creationId xmlns:p14="http://schemas.microsoft.com/office/powerpoint/2010/main" val="167962451"/>
+        <p14:creationId xmlns:p14="http://schemas.microsoft.com/office/powerpoint/2010/main" xmlns="" val="167962451"/>
       </p:ext>
     </p:extLst>
   </p:cSld>
@@ -4914,7 +4754,7 @@
     </p:spTree>
     <p:extLst>
       <p:ext uri="{BB962C8B-B14F-4D97-AF65-F5344CB8AC3E}">
-        <p14:creationId xmlns:p14="http://schemas.microsoft.com/office/powerpoint/2010/main" val="4145891394"/>
+        <p14:creationId xmlns:p14="http://schemas.microsoft.com/office/powerpoint/2010/main" xmlns="" val="4145891394"/>
       </p:ext>
     </p:extLst>
   </p:cSld>
@@ -5075,7 +4915,7 @@
     </p:spTree>
     <p:extLst>
       <p:ext uri="{BB962C8B-B14F-4D97-AF65-F5344CB8AC3E}">
-        <p14:creationId xmlns:p14="http://schemas.microsoft.com/office/powerpoint/2010/main" val="2212600742"/>
+        <p14:creationId xmlns:p14="http://schemas.microsoft.com/office/powerpoint/2010/main" xmlns="" val="2212600742"/>
       </p:ext>
     </p:extLst>
   </p:cSld>
@@ -5211,7 +5051,7 @@
     </p:spTree>
     <p:extLst>
       <p:ext uri="{BB962C8B-B14F-4D97-AF65-F5344CB8AC3E}">
-        <p14:creationId xmlns:p14="http://schemas.microsoft.com/office/powerpoint/2010/main" val="1149839373"/>
+        <p14:creationId xmlns:p14="http://schemas.microsoft.com/office/powerpoint/2010/main" xmlns="" val="1149839373"/>
       </p:ext>
     </p:extLst>
   </p:cSld>
@@ -5275,7 +5115,7 @@
           <p:nvPr>
             <p:extLst>
               <p:ext uri="{D42A27DB-BD31-4B8C-83A1-F6EECF244321}">
-                <p14:modId xmlns:p14="http://schemas.microsoft.com/office/powerpoint/2010/main" val="228964426"/>
+                <p14:modId xmlns:p14="http://schemas.microsoft.com/office/powerpoint/2010/main" xmlns="" val="228964426"/>
               </p:ext>
             </p:extLst>
           </p:nvPr>
@@ -5293,7 +5133,7 @@
     </p:spTree>
     <p:extLst>
       <p:ext uri="{BB962C8B-B14F-4D97-AF65-F5344CB8AC3E}">
-        <p14:creationId xmlns:p14="http://schemas.microsoft.com/office/powerpoint/2010/main" val="3764213864"/>
+        <p14:creationId xmlns:p14="http://schemas.microsoft.com/office/powerpoint/2010/main" xmlns="" val="3764213864"/>
       </p:ext>
     </p:extLst>
   </p:cSld>
@@ -5357,7 +5197,7 @@
           <p:nvPr>
             <p:extLst>
               <p:ext uri="{D42A27DB-BD31-4B8C-83A1-F6EECF244321}">
-                <p14:modId xmlns:p14="http://schemas.microsoft.com/office/powerpoint/2010/main" val="2320101748"/>
+                <p14:modId xmlns:p14="http://schemas.microsoft.com/office/powerpoint/2010/main" xmlns="" val="2320101748"/>
               </p:ext>
             </p:extLst>
           </p:nvPr>
@@ -5375,7 +5215,7 @@
     </p:spTree>
     <p:extLst>
       <p:ext uri="{BB962C8B-B14F-4D97-AF65-F5344CB8AC3E}">
-        <p14:creationId xmlns:p14="http://schemas.microsoft.com/office/powerpoint/2010/main" val="996800918"/>
+        <p14:creationId xmlns:p14="http://schemas.microsoft.com/office/powerpoint/2010/main" xmlns="" val="996800918"/>
       </p:ext>
     </p:extLst>
   </p:cSld>
@@ -5439,7 +5279,7 @@
           <p:nvPr>
             <p:extLst>
               <p:ext uri="{D42A27DB-BD31-4B8C-83A1-F6EECF244321}">
-                <p14:modId xmlns:p14="http://schemas.microsoft.com/office/powerpoint/2010/main" val="896780294"/>
+                <p14:modId xmlns:p14="http://schemas.microsoft.com/office/powerpoint/2010/main" xmlns="" val="896780294"/>
               </p:ext>
             </p:extLst>
           </p:nvPr>
@@ -5457,7 +5297,7 @@
     </p:spTree>
     <p:extLst>
       <p:ext uri="{BB962C8B-B14F-4D97-AF65-F5344CB8AC3E}">
-        <p14:creationId xmlns:p14="http://schemas.microsoft.com/office/powerpoint/2010/main" val="12642191"/>
+        <p14:creationId xmlns:p14="http://schemas.microsoft.com/office/powerpoint/2010/main" xmlns="" val="12642191"/>
       </p:ext>
     </p:extLst>
   </p:cSld>
@@ -5521,7 +5361,7 @@
           <p:nvPr>
             <p:extLst>
               <p:ext uri="{D42A27DB-BD31-4B8C-83A1-F6EECF244321}">
-                <p14:modId xmlns:p14="http://schemas.microsoft.com/office/powerpoint/2010/main" val="4222226759"/>
+                <p14:modId xmlns:p14="http://schemas.microsoft.com/office/powerpoint/2010/main" xmlns="" val="4222226759"/>
               </p:ext>
             </p:extLst>
           </p:nvPr>
@@ -5539,7 +5379,7 @@
     </p:spTree>
     <p:extLst>
       <p:ext uri="{BB962C8B-B14F-4D97-AF65-F5344CB8AC3E}">
-        <p14:creationId xmlns:p14="http://schemas.microsoft.com/office/powerpoint/2010/main" val="4222572546"/>
+        <p14:creationId xmlns:p14="http://schemas.microsoft.com/office/powerpoint/2010/main" xmlns="" val="4222572546"/>
       </p:ext>
     </p:extLst>
   </p:cSld>
@@ -5603,7 +5443,7 @@
           <p:nvPr>
             <p:extLst>
               <p:ext uri="{D42A27DB-BD31-4B8C-83A1-F6EECF244321}">
-                <p14:modId xmlns:p14="http://schemas.microsoft.com/office/powerpoint/2010/main" val="443036598"/>
+                <p14:modId xmlns:p14="http://schemas.microsoft.com/office/powerpoint/2010/main" xmlns="" val="443036598"/>
               </p:ext>
             </p:extLst>
           </p:nvPr>
@@ -5621,7 +5461,7 @@
     </p:spTree>
     <p:extLst>
       <p:ext uri="{BB962C8B-B14F-4D97-AF65-F5344CB8AC3E}">
-        <p14:creationId xmlns:p14="http://schemas.microsoft.com/office/powerpoint/2010/main" val="355807101"/>
+        <p14:creationId xmlns:p14="http://schemas.microsoft.com/office/powerpoint/2010/main" xmlns="" val="355807101"/>
       </p:ext>
     </p:extLst>
   </p:cSld>
@@ -5685,7 +5525,7 @@
           <p:nvPr>
             <p:extLst>
               <p:ext uri="{D42A27DB-BD31-4B8C-83A1-F6EECF244321}">
-                <p14:modId xmlns:p14="http://schemas.microsoft.com/office/powerpoint/2010/main" val="728387088"/>
+                <p14:modId xmlns:p14="http://schemas.microsoft.com/office/powerpoint/2010/main" xmlns="" val="728387088"/>
               </p:ext>
             </p:extLst>
           </p:nvPr>
@@ -5703,7 +5543,7 @@
     </p:spTree>
     <p:extLst>
       <p:ext uri="{BB962C8B-B14F-4D97-AF65-F5344CB8AC3E}">
-        <p14:creationId xmlns:p14="http://schemas.microsoft.com/office/powerpoint/2010/main" val="3238537544"/>
+        <p14:creationId xmlns:p14="http://schemas.microsoft.com/office/powerpoint/2010/main" xmlns="" val="3238537544"/>
       </p:ext>
     </p:extLst>
   </p:cSld>
@@ -5827,7 +5667,7 @@
           <a:blip r:embed="rId2" cstate="print">
             <a:extLst>
               <a:ext uri="{28A0092B-C50C-407E-A947-70E740481C1C}">
-                <a14:useLocalDpi xmlns:a14="http://schemas.microsoft.com/office/drawing/2010/main" val="0"/>
+                <a14:useLocalDpi xmlns:a14="http://schemas.microsoft.com/office/drawing/2010/main" xmlns="" val="0"/>
               </a:ext>
             </a:extLst>
           </a:blip>
@@ -5847,7 +5687,7 @@
           <a:noFill/>
           <a:extLst>
             <a:ext uri="{909E8E84-426E-40DD-AFC4-6F175D3DCCD1}">
-              <a14:hiddenFill xmlns:a14="http://schemas.microsoft.com/office/drawing/2010/main">
+              <a14:hiddenFill xmlns:a14="http://schemas.microsoft.com/office/drawing/2010/main" xmlns="">
                 <a:solidFill>
                   <a:srgbClr val="FFFFFF"/>
                 </a:solidFill>
@@ -5859,7 +5699,7 @@
     </p:spTree>
     <p:extLst>
       <p:ext uri="{BB962C8B-B14F-4D97-AF65-F5344CB8AC3E}">
-        <p14:creationId xmlns:p14="http://schemas.microsoft.com/office/powerpoint/2010/main" val="3044713512"/>
+        <p14:creationId xmlns:p14="http://schemas.microsoft.com/office/powerpoint/2010/main" xmlns="" val="3044713512"/>
       </p:ext>
     </p:extLst>
   </p:cSld>
@@ -5929,7 +5769,7 @@
         <p:spPr/>
         <p:txBody>
           <a:bodyPr>
-            <a:normAutofit fontScale="92500" lnSpcReduction="10000"/>
+            <a:normAutofit/>
           </a:bodyPr>
           <a:lstStyle/>
           <a:p>
@@ -5950,12 +5790,9 @@
           <a:p>
             <a:r>
               <a:rPr lang="da-DK" dirty="0" smtClean="0"/>
-              <a:t>Reading </a:t>
-            </a:r>
-            <a:r>
-              <a:rPr lang="da-DK" dirty="0"/>
-              <a:t>code</a:t>
-            </a:r>
+              <a:t>Exercises</a:t>
+            </a:r>
+            <a:endParaRPr lang="da-DK" dirty="0"/>
           </a:p>
           <a:p>
             <a:pPr marL="0" indent="0">
@@ -5969,30 +5806,9 @@
           <a:p>
             <a:r>
               <a:rPr lang="da-DK" dirty="0" smtClean="0"/>
-              <a:t>Writing </a:t>
-            </a:r>
-            <a:r>
-              <a:rPr lang="da-DK" dirty="0"/>
-              <a:t>code</a:t>
-            </a:r>
-          </a:p>
-          <a:p>
-            <a:pPr lvl="1"/>
-            <a:r>
-              <a:rPr lang="da-DK" dirty="0"/>
-              <a:t>New code</a:t>
-            </a:r>
-          </a:p>
-          <a:p>
-            <a:pPr lvl="1"/>
-            <a:r>
-              <a:rPr lang="da-DK" dirty="0"/>
-              <a:t>Changing existing </a:t>
-            </a:r>
-            <a:r>
-              <a:rPr lang="da-DK" dirty="0" smtClean="0"/>
-              <a:t>code</a:t>
-            </a:r>
+              <a:t>Exercises</a:t>
+            </a:r>
+            <a:endParaRPr lang="da-DK" dirty="0" smtClean="0"/>
           </a:p>
           <a:p>
             <a:pPr marL="0" indent="0">
@@ -6016,7 +5832,7 @@
     </p:spTree>
     <p:extLst>
       <p:ext uri="{BB962C8B-B14F-4D97-AF65-F5344CB8AC3E}">
-        <p14:creationId xmlns:p14="http://schemas.microsoft.com/office/powerpoint/2010/main" val="1383946699"/>
+        <p14:creationId xmlns:p14="http://schemas.microsoft.com/office/powerpoint/2010/main" xmlns="" val="1383946699"/>
       </p:ext>
     </p:extLst>
   </p:cSld>
@@ -6143,7 +5959,7 @@
     </p:spTree>
     <p:extLst>
       <p:ext uri="{BB962C8B-B14F-4D97-AF65-F5344CB8AC3E}">
-        <p14:creationId xmlns:p14="http://schemas.microsoft.com/office/powerpoint/2010/main" val="2102622275"/>
+        <p14:creationId xmlns:p14="http://schemas.microsoft.com/office/powerpoint/2010/main" xmlns="" val="2102622275"/>
       </p:ext>
     </p:extLst>
   </p:cSld>
@@ -6262,7 +6078,7 @@
     </p:spTree>
     <p:extLst>
       <p:ext uri="{BB962C8B-B14F-4D97-AF65-F5344CB8AC3E}">
-        <p14:creationId xmlns:p14="http://schemas.microsoft.com/office/powerpoint/2010/main" val="515773726"/>
+        <p14:creationId xmlns:p14="http://schemas.microsoft.com/office/powerpoint/2010/main" xmlns="" val="515773726"/>
       </p:ext>
     </p:extLst>
   </p:cSld>
@@ -6338,8 +6154,13 @@
           <a:p>
             <a:r>
               <a:rPr lang="da-DK" dirty="0" smtClean="0"/>
-              <a:t>Breadth over Depth</a:t>
-            </a:r>
+              <a:t>Breadth over </a:t>
+            </a:r>
+            <a:r>
+              <a:rPr lang="da-DK" dirty="0" smtClean="0"/>
+              <a:t>depth</a:t>
+            </a:r>
+            <a:endParaRPr lang="da-DK" dirty="0" smtClean="0"/>
           </a:p>
           <a:p>
             <a:endParaRPr lang="da-DK" dirty="0" smtClean="0"/>
@@ -6621,7 +6442,7 @@
     </p:spTree>
     <p:extLst>
       <p:ext uri="{BB962C8B-B14F-4D97-AF65-F5344CB8AC3E}">
-        <p14:creationId xmlns:p14="http://schemas.microsoft.com/office/powerpoint/2010/main" val="578547949"/>
+        <p14:creationId xmlns:p14="http://schemas.microsoft.com/office/powerpoint/2010/main" xmlns="" val="578547949"/>
       </p:ext>
     </p:extLst>
   </p:cSld>
@@ -6639,7 +6460,7 @@
 </file>
 
 <file path=ppt/slides/slide5.xml><?xml version="1.0" encoding="utf-8"?>
-<p:sld xmlns:a="http://schemas.openxmlformats.org/drawingml/2006/main" xmlns:r="http://schemas.openxmlformats.org/officeDocument/2006/relationships" xmlns:p="http://schemas.openxmlformats.org/presentationml/2006/main">
+<p:sld xmlns:a="http://schemas.openxmlformats.org/drawingml/2006/main" xmlns:r="http://schemas.openxmlformats.org/officeDocument/2006/relationships" xmlns:p="http://schemas.openxmlformats.org/presentationml/2006/main" show="0">
   <p:cSld>
     <p:spTree>
       <p:nvGrpSpPr>
@@ -6697,8 +6518,9 @@
           <a:p>
             <a:r>
               <a:rPr lang="da-DK" dirty="0" smtClean="0"/>
-              <a:t>Pairs</a:t>
-            </a:r>
+              <a:t>Pairs </a:t>
+            </a:r>
+            <a:endParaRPr lang="da-DK" dirty="0" smtClean="0"/>
           </a:p>
           <a:p>
             <a:endParaRPr lang="da-DK" dirty="0" smtClean="0"/>
@@ -6752,13 +6574,14 @@
     </p:spTree>
     <p:extLst>
       <p:ext uri="{BB962C8B-B14F-4D97-AF65-F5344CB8AC3E}">
-        <p14:creationId xmlns:p14="http://schemas.microsoft.com/office/powerpoint/2010/main" val="4173076907"/>
+        <p14:creationId xmlns:p14="http://schemas.microsoft.com/office/powerpoint/2010/main" xmlns="" val="4173076907"/>
       </p:ext>
     </p:extLst>
   </p:cSld>
   <p:clrMapOvr>
     <a:masterClrMapping/>
   </p:clrMapOvr>
+  <p:transition/>
   <p:timing>
     <p:tnLst>
       <p:par>
@@ -6819,7 +6642,7 @@
             <p:ph idx="1"/>
             <p:extLst>
               <p:ext uri="{D42A27DB-BD31-4B8C-83A1-F6EECF244321}">
-                <p14:modId xmlns:p14="http://schemas.microsoft.com/office/powerpoint/2010/main" val="838368028"/>
+                <p14:modId xmlns:p14="http://schemas.microsoft.com/office/powerpoint/2010/main" xmlns="" val="838368028"/>
               </p:ext>
             </p:extLst>
           </p:nvPr>
@@ -7045,7 +6868,7 @@
     </p:spTree>
     <p:extLst>
       <p:ext uri="{BB962C8B-B14F-4D97-AF65-F5344CB8AC3E}">
-        <p14:creationId xmlns:p14="http://schemas.microsoft.com/office/powerpoint/2010/main" val="1308988046"/>
+        <p14:creationId xmlns:p14="http://schemas.microsoft.com/office/powerpoint/2010/main" xmlns="" val="1308988046"/>
       </p:ext>
     </p:extLst>
   </p:cSld>
@@ -7191,7 +7014,7 @@
     </p:spTree>
     <p:extLst>
       <p:ext uri="{BB962C8B-B14F-4D97-AF65-F5344CB8AC3E}">
-        <p14:creationId xmlns:p14="http://schemas.microsoft.com/office/powerpoint/2010/main" val="3595684685"/>
+        <p14:creationId xmlns:p14="http://schemas.microsoft.com/office/powerpoint/2010/main" xmlns="" val="3595684685"/>
       </p:ext>
     </p:extLst>
   </p:cSld>
@@ -7371,7 +7194,7 @@
           </a:p>
           <a:p>
             <a:r>
-              <a:rPr lang="da-DK" dirty="0" smtClean="0">
+              <a:rPr lang="da-DK" i="1" dirty="0" smtClean="0">
                 <a:solidFill>
                   <a:schemeClr val="bg1"/>
                 </a:solidFill>
@@ -7379,7 +7202,7 @@
               <a:t>No </a:t>
             </a:r>
             <a:r>
-              <a:rPr lang="da-DK" dirty="0">
+              <a:rPr lang="da-DK" i="1" dirty="0">
                 <a:solidFill>
                   <a:schemeClr val="bg1"/>
                 </a:solidFill>
@@ -7407,7 +7230,7 @@
     </p:spTree>
     <p:extLst>
       <p:ext uri="{BB962C8B-B14F-4D97-AF65-F5344CB8AC3E}">
-        <p14:creationId xmlns:p14="http://schemas.microsoft.com/office/powerpoint/2010/main" val="3062657029"/>
+        <p14:creationId xmlns:p14="http://schemas.microsoft.com/office/powerpoint/2010/main" xmlns="" val="3062657029"/>
       </p:ext>
     </p:extLst>
   </p:cSld>
@@ -7493,7 +7316,7 @@
         <p:spPr/>
         <p:txBody>
           <a:bodyPr>
-            <a:normAutofit lnSpcReduction="10000"/>
+            <a:normAutofit fontScale="92500" lnSpcReduction="10000"/>
           </a:bodyPr>
           <a:lstStyle/>
           <a:p>
@@ -7536,34 +7359,11 @@
                   <a:schemeClr val="bg1"/>
                 </a:solidFill>
               </a:rPr>
-              <a:t>Solve exercise as you normally would</a:t>
-            </a:r>
-          </a:p>
-          <a:p>
-            <a:endParaRPr lang="da-DK" dirty="0">
-              <a:solidFill>
-                <a:schemeClr val="bg1"/>
-              </a:solidFill>
-            </a:endParaRPr>
-          </a:p>
-          <a:p>
-            <a:r>
-              <a:rPr lang="da-DK" dirty="0" smtClean="0">
-                <a:solidFill>
-                  <a:schemeClr val="bg1"/>
-                </a:solidFill>
-              </a:rPr>
-              <a:t>Maybe try without mouse</a:t>
-            </a:r>
-          </a:p>
-          <a:p>
-            <a:endParaRPr lang="da-DK" dirty="0">
-              <a:solidFill>
-                <a:schemeClr val="bg1"/>
-              </a:solidFill>
-            </a:endParaRPr>
-          </a:p>
-          <a:p>
+              <a:t>Pair</a:t>
+            </a:r>
+          </a:p>
+          <a:p>
+            <a:pPr lvl="1"/>
             <a:r>
               <a:rPr lang="da-DK" dirty="0" smtClean="0">
                 <a:solidFill>
@@ -7572,18 +7372,70 @@
               </a:rPr>
               <a:t>Navigator times it</a:t>
             </a:r>
+          </a:p>
+          <a:p>
+            <a:endParaRPr lang="da-DK" dirty="0" smtClean="0">
+              <a:solidFill>
+                <a:schemeClr val="bg1"/>
+              </a:solidFill>
+            </a:endParaRPr>
+          </a:p>
+          <a:p>
+            <a:r>
+              <a:rPr lang="da-DK" dirty="0" smtClean="0">
+                <a:solidFill>
+                  <a:schemeClr val="bg1"/>
+                </a:solidFill>
+              </a:rPr>
+              <a:t>Solve </a:t>
+            </a:r>
+            <a:r>
+              <a:rPr lang="da-DK" dirty="0" smtClean="0">
+                <a:solidFill>
+                  <a:schemeClr val="bg1"/>
+                </a:solidFill>
+              </a:rPr>
+              <a:t>exercise as you normally would</a:t>
+            </a:r>
+          </a:p>
+          <a:p>
             <a:endParaRPr lang="da-DK" dirty="0">
               <a:solidFill>
                 <a:schemeClr val="bg1"/>
               </a:solidFill>
             </a:endParaRPr>
           </a:p>
+          <a:p>
+            <a:r>
+              <a:rPr lang="da-DK" dirty="0" smtClean="0">
+                <a:solidFill>
+                  <a:schemeClr val="bg1"/>
+                </a:solidFill>
+              </a:rPr>
+              <a:t>Try </a:t>
+            </a:r>
+            <a:r>
+              <a:rPr lang="da-DK" dirty="0" smtClean="0">
+                <a:solidFill>
+                  <a:schemeClr val="bg1"/>
+                </a:solidFill>
+              </a:rPr>
+              <a:t>without mouse</a:t>
+            </a:r>
+          </a:p>
+          <a:p>
+            <a:endParaRPr lang="da-DK" dirty="0" smtClean="0">
+              <a:solidFill>
+                <a:schemeClr val="bg1"/>
+              </a:solidFill>
+            </a:endParaRPr>
+          </a:p>
         </p:txBody>
       </p:sp>
     </p:spTree>
     <p:extLst>
       <p:ext uri="{BB962C8B-B14F-4D97-AF65-F5344CB8AC3E}">
-        <p14:creationId xmlns:p14="http://schemas.microsoft.com/office/powerpoint/2010/main" val="3272303398"/>
+        <p14:creationId xmlns:p14="http://schemas.microsoft.com/office/powerpoint/2010/main" xmlns="" val="3272303398"/>
       </p:ext>
     </p:extLst>
   </p:cSld>

</xml_diff>

<commit_message>
Added FoD LINQ example to context class.
</commit_message>
<xml_diff>
--- a/Presentations/1 - Introduction - ReSharper Course.pptx
+++ b/Presentations/1 - Introduction - ReSharper Course.pptx
@@ -325,11 +325,11 @@
         </c:dLbls>
         <c:marker val="1"/>
         <c:smooth val="0"/>
-        <c:axId val="4728320"/>
-        <c:axId val="4729856"/>
+        <c:axId val="6156672"/>
+        <c:axId val="6158208"/>
       </c:lineChart>
       <c:catAx>
-        <c:axId val="4728320"/>
+        <c:axId val="6156672"/>
         <c:scaling>
           <c:orientation val="minMax"/>
         </c:scaling>
@@ -339,7 +339,7 @@
         <c:majorTickMark val="out"/>
         <c:minorTickMark val="none"/>
         <c:tickLblPos val="nextTo"/>
-        <c:crossAx val="4729856"/>
+        <c:crossAx val="6158208"/>
         <c:crosses val="autoZero"/>
         <c:auto val="1"/>
         <c:lblAlgn val="ctr"/>
@@ -347,7 +347,7 @@
         <c:noMultiLvlLbl val="0"/>
       </c:catAx>
       <c:valAx>
-        <c:axId val="4729856"/>
+        <c:axId val="6158208"/>
         <c:scaling>
           <c:orientation val="minMax"/>
         </c:scaling>
@@ -358,7 +358,7 @@
         <c:majorTickMark val="out"/>
         <c:minorTickMark val="none"/>
         <c:tickLblPos val="none"/>
-        <c:crossAx val="4728320"/>
+        <c:crossAx val="6156672"/>
         <c:crosses val="autoZero"/>
         <c:crossBetween val="between"/>
       </c:valAx>

</xml_diff>